<commit_message>
add digital human unity workflow
</commit_message>
<xml_diff>
--- a/数字人项目/unity版/曾鸣数字人项目笔记1/数字人相关PPT.pptx
+++ b/数字人项目/unity版/曾鸣数字人项目笔记1/数字人相关PPT.pptx
@@ -8,6 +8,7 @@
     <p:sldId id="256" r:id="rId2"/>
     <p:sldId id="257" r:id="rId3"/>
     <p:sldId id="258" r:id="rId4"/>
+    <p:sldId id="259" r:id="rId5"/>
   </p:sldIdLst>
   <p:sldSz cx="12192000" cy="6858000"/>
   <p:notesSz cx="6858000" cy="9144000"/>
@@ -243,7 +244,7 @@
           <a:p>
             <a:fld id="{D997B5FA-0921-464F-AAE1-844C04324D75}" type="datetimeFigureOut">
               <a:rPr lang="zh-CN" altLang="en-US" smtClean="0"/>
-              <a:t>2023/3/10</a:t>
+              <a:t>2023/3/12</a:t>
             </a:fld>
             <a:endParaRPr lang="zh-CN" altLang="en-US"/>
           </a:p>
@@ -411,7 +412,7 @@
           <a:p>
             <a:fld id="{D997B5FA-0921-464F-AAE1-844C04324D75}" type="datetimeFigureOut">
               <a:rPr lang="zh-CN" altLang="en-US" smtClean="0"/>
-              <a:t>2023/3/10</a:t>
+              <a:t>2023/3/12</a:t>
             </a:fld>
             <a:endParaRPr lang="zh-CN" altLang="en-US"/>
           </a:p>
@@ -589,7 +590,7 @@
           <a:p>
             <a:fld id="{D997B5FA-0921-464F-AAE1-844C04324D75}" type="datetimeFigureOut">
               <a:rPr lang="zh-CN" altLang="en-US" smtClean="0"/>
-              <a:t>2023/3/10</a:t>
+              <a:t>2023/3/12</a:t>
             </a:fld>
             <a:endParaRPr lang="zh-CN" altLang="en-US"/>
           </a:p>
@@ -757,7 +758,7 @@
           <a:p>
             <a:fld id="{D997B5FA-0921-464F-AAE1-844C04324D75}" type="datetimeFigureOut">
               <a:rPr lang="zh-CN" altLang="en-US" smtClean="0"/>
-              <a:t>2023/3/10</a:t>
+              <a:t>2023/3/12</a:t>
             </a:fld>
             <a:endParaRPr lang="zh-CN" altLang="en-US"/>
           </a:p>
@@ -1002,7 +1003,7 @@
           <a:p>
             <a:fld id="{D997B5FA-0921-464F-AAE1-844C04324D75}" type="datetimeFigureOut">
               <a:rPr lang="zh-CN" altLang="en-US" smtClean="0"/>
-              <a:t>2023/3/10</a:t>
+              <a:t>2023/3/12</a:t>
             </a:fld>
             <a:endParaRPr lang="zh-CN" altLang="en-US"/>
           </a:p>
@@ -1231,7 +1232,7 @@
           <a:p>
             <a:fld id="{D997B5FA-0921-464F-AAE1-844C04324D75}" type="datetimeFigureOut">
               <a:rPr lang="zh-CN" altLang="en-US" smtClean="0"/>
-              <a:t>2023/3/10</a:t>
+              <a:t>2023/3/12</a:t>
             </a:fld>
             <a:endParaRPr lang="zh-CN" altLang="en-US"/>
           </a:p>
@@ -1595,7 +1596,7 @@
           <a:p>
             <a:fld id="{D997B5FA-0921-464F-AAE1-844C04324D75}" type="datetimeFigureOut">
               <a:rPr lang="zh-CN" altLang="en-US" smtClean="0"/>
-              <a:t>2023/3/10</a:t>
+              <a:t>2023/3/12</a:t>
             </a:fld>
             <a:endParaRPr lang="zh-CN" altLang="en-US"/>
           </a:p>
@@ -1712,7 +1713,7 @@
           <a:p>
             <a:fld id="{D997B5FA-0921-464F-AAE1-844C04324D75}" type="datetimeFigureOut">
               <a:rPr lang="zh-CN" altLang="en-US" smtClean="0"/>
-              <a:t>2023/3/10</a:t>
+              <a:t>2023/3/12</a:t>
             </a:fld>
             <a:endParaRPr lang="zh-CN" altLang="en-US"/>
           </a:p>
@@ -1807,7 +1808,7 @@
           <a:p>
             <a:fld id="{D997B5FA-0921-464F-AAE1-844C04324D75}" type="datetimeFigureOut">
               <a:rPr lang="zh-CN" altLang="en-US" smtClean="0"/>
-              <a:t>2023/3/10</a:t>
+              <a:t>2023/3/12</a:t>
             </a:fld>
             <a:endParaRPr lang="zh-CN" altLang="en-US"/>
           </a:p>
@@ -2082,7 +2083,7 @@
           <a:p>
             <a:fld id="{D997B5FA-0921-464F-AAE1-844C04324D75}" type="datetimeFigureOut">
               <a:rPr lang="zh-CN" altLang="en-US" smtClean="0"/>
-              <a:t>2023/3/10</a:t>
+              <a:t>2023/3/12</a:t>
             </a:fld>
             <a:endParaRPr lang="zh-CN" altLang="en-US"/>
           </a:p>
@@ -2334,7 +2335,7 @@
           <a:p>
             <a:fld id="{D997B5FA-0921-464F-AAE1-844C04324D75}" type="datetimeFigureOut">
               <a:rPr lang="zh-CN" altLang="en-US" smtClean="0"/>
-              <a:t>2023/3/10</a:t>
+              <a:t>2023/3/12</a:t>
             </a:fld>
             <a:endParaRPr lang="zh-CN" altLang="en-US"/>
           </a:p>
@@ -2545,7 +2546,7 @@
           <a:p>
             <a:fld id="{D997B5FA-0921-464F-AAE1-844C04324D75}" type="datetimeFigureOut">
               <a:rPr lang="zh-CN" altLang="en-US" smtClean="0"/>
-              <a:t>2023/3/10</a:t>
+              <a:t>2023/3/12</a:t>
             </a:fld>
             <a:endParaRPr lang="zh-CN" altLang="en-US"/>
           </a:p>
@@ -3523,6 +3524,170 @@
 </p:sld>
 </file>
 
+<file path=ppt/slides/slide4.xml><?xml version="1.0" encoding="utf-8"?>
+<p:sld xmlns:a="http://schemas.openxmlformats.org/drawingml/2006/main" xmlns:r="http://schemas.openxmlformats.org/officeDocument/2006/relationships" xmlns:p="http://schemas.openxmlformats.org/presentationml/2006/main">
+  <p:cSld>
+    <p:spTree>
+      <p:nvGrpSpPr>
+        <p:cNvPr id="1" name=""/>
+        <p:cNvGrpSpPr/>
+        <p:nvPr/>
+      </p:nvGrpSpPr>
+      <p:grpSpPr>
+        <a:xfrm>
+          <a:off x="0" y="0"/>
+          <a:ext cx="0" cy="0"/>
+          <a:chOff x="0" y="0"/>
+          <a:chExt cx="0" cy="0"/>
+        </a:xfrm>
+      </p:grpSpPr>
+      <p:pic>
+        <p:nvPicPr>
+          <p:cNvPr id="5" name="图片 4">
+            <a:extLst>
+              <a:ext uri="{FF2B5EF4-FFF2-40B4-BE49-F238E27FC236}">
+                <a16:creationId xmlns:a16="http://schemas.microsoft.com/office/drawing/2014/main" id="{44E17E7C-A88D-BBF7-C873-9E90D3AFF3A0}"/>
+              </a:ext>
+            </a:extLst>
+          </p:cNvPr>
+          <p:cNvPicPr>
+            <a:picLocks noChangeAspect="1"/>
+          </p:cNvPicPr>
+          <p:nvPr/>
+        </p:nvPicPr>
+        <p:blipFill>
+          <a:blip r:embed="rId2"/>
+          <a:stretch>
+            <a:fillRect/>
+          </a:stretch>
+        </p:blipFill>
+        <p:spPr>
+          <a:xfrm>
+            <a:off x="372983" y="429039"/>
+            <a:ext cx="5268769" cy="2353851"/>
+          </a:xfrm>
+          <a:prstGeom prst="rect">
+            <a:avLst/>
+          </a:prstGeom>
+        </p:spPr>
+      </p:pic>
+      <p:sp>
+        <p:nvSpPr>
+          <p:cNvPr id="6" name="文本框 5">
+            <a:extLst>
+              <a:ext uri="{FF2B5EF4-FFF2-40B4-BE49-F238E27FC236}">
+                <a16:creationId xmlns:a16="http://schemas.microsoft.com/office/drawing/2014/main" id="{D0FD0B31-91F2-D5FB-7A4C-1EEEE07331A7}"/>
+              </a:ext>
+            </a:extLst>
+          </p:cNvPr>
+          <p:cNvSpPr txBox="1"/>
+          <p:nvPr/>
+        </p:nvSpPr>
+        <p:spPr>
+          <a:xfrm>
+            <a:off x="372983" y="3615209"/>
+            <a:ext cx="5699234" cy="369332"/>
+          </a:xfrm>
+          <a:prstGeom prst="rect">
+            <a:avLst/>
+          </a:prstGeom>
+          <a:noFill/>
+        </p:spPr>
+        <p:txBody>
+          <a:bodyPr wrap="square" rtlCol="0">
+            <a:spAutoFit/>
+          </a:bodyPr>
+          <a:lstStyle/>
+          <a:p>
+            <a:r>
+              <a:rPr lang="en-US" altLang="zh-CN" dirty="0" err="1"/>
+              <a:t>Numpy</a:t>
+            </a:r>
+            <a:r>
+              <a:rPr lang="zh-CN" altLang="en-US" dirty="0"/>
+              <a:t>输出到文件中的结果，方便解析；</a:t>
+            </a:r>
+          </a:p>
+        </p:txBody>
+      </p:sp>
+      <p:pic>
+        <p:nvPicPr>
+          <p:cNvPr id="8" name="图片 7">
+            <a:extLst>
+              <a:ext uri="{FF2B5EF4-FFF2-40B4-BE49-F238E27FC236}">
+                <a16:creationId xmlns:a16="http://schemas.microsoft.com/office/drawing/2014/main" id="{5A8D2819-C98F-DC33-23A6-71E89F2D4762}"/>
+              </a:ext>
+            </a:extLst>
+          </p:cNvPr>
+          <p:cNvPicPr>
+            <a:picLocks noChangeAspect="1"/>
+          </p:cNvPicPr>
+          <p:nvPr/>
+        </p:nvPicPr>
+        <p:blipFill>
+          <a:blip r:embed="rId3"/>
+          <a:stretch>
+            <a:fillRect/>
+          </a:stretch>
+        </p:blipFill>
+        <p:spPr>
+          <a:xfrm>
+            <a:off x="5992077" y="245799"/>
+            <a:ext cx="6104149" cy="3292125"/>
+          </a:xfrm>
+          <a:prstGeom prst="rect">
+            <a:avLst/>
+          </a:prstGeom>
+        </p:spPr>
+      </p:pic>
+      <p:sp>
+        <p:nvSpPr>
+          <p:cNvPr id="9" name="文本框 8">
+            <a:extLst>
+              <a:ext uri="{FF2B5EF4-FFF2-40B4-BE49-F238E27FC236}">
+                <a16:creationId xmlns:a16="http://schemas.microsoft.com/office/drawing/2014/main" id="{5AF7E57A-5CE3-C92C-F3EA-044CEE4761F7}"/>
+              </a:ext>
+            </a:extLst>
+          </p:cNvPr>
+          <p:cNvSpPr txBox="1"/>
+          <p:nvPr/>
+        </p:nvSpPr>
+        <p:spPr>
+          <a:xfrm>
+            <a:off x="6868511" y="3615209"/>
+            <a:ext cx="4986884" cy="369332"/>
+          </a:xfrm>
+          <a:prstGeom prst="rect">
+            <a:avLst/>
+          </a:prstGeom>
+          <a:noFill/>
+        </p:spPr>
+        <p:txBody>
+          <a:bodyPr wrap="square" rtlCol="0">
+            <a:spAutoFit/>
+          </a:bodyPr>
+          <a:lstStyle/>
+          <a:p>
+            <a:r>
+              <a:rPr lang="zh-CN" altLang="en-US" dirty="0"/>
+              <a:t>正常输出流中的结果：不好解析</a:t>
+            </a:r>
+          </a:p>
+        </p:txBody>
+      </p:sp>
+    </p:spTree>
+    <p:extLst>
+      <p:ext uri="{BB962C8B-B14F-4D97-AF65-F5344CB8AC3E}">
+        <p14:creationId xmlns:p14="http://schemas.microsoft.com/office/powerpoint/2010/main" val="3379687169"/>
+      </p:ext>
+    </p:extLst>
+  </p:cSld>
+  <p:clrMapOvr>
+    <a:masterClrMapping/>
+  </p:clrMapOvr>
+</p:sld>
+</file>
+
 <file path=ppt/theme/theme1.xml><?xml version="1.0" encoding="utf-8"?>
 <a:theme xmlns:a="http://schemas.openxmlformats.org/drawingml/2006/main" name="Office 主题">
   <a:themeElements>

</xml_diff>